<commit_message>
started fed learning / local sphere presentation
</commit_message>
<xml_diff>
--- a/2017/CD-MAKE_2017/Fed/Modern_PubSub.pptx
+++ b/2017/CD-MAKE_2017/Fed/Modern_PubSub.pptx
@@ -5,7 +5,9 @@
     <p:sldMasterId id="2147483648" r:id="rId1"/>
   </p:sldMasterIdLst>
   <p:sldIdLst>
-    <p:sldId id="256" r:id="rId3"/>
+    <p:sldId id="258" r:id="rId3"/>
+    <p:sldId id="259" r:id="rId4"/>
+    <p:sldId id="256" r:id="rId5"/>
   </p:sldIdLst>
   <p:sldSz cx="12192000" cy="6858000"/>
   <p:notesSz cx="6858000" cy="9144000"/>
@@ -2916,9 +2918,87 @@
         <p:nvPr/>
       </p:nvGrpSpPr>
       <p:grpSpPr/>
+      <p:sp>
+        <p:nvSpPr>
+          <p:cNvPr id="4" name="Striped Right Arrow 3"/>
+          <p:cNvSpPr/>
+          <p:nvPr/>
+        </p:nvSpPr>
+        <p:spPr>
+          <a:xfrm>
+            <a:off x="2692400" y="1837055"/>
+            <a:ext cx="6896735" cy="359410"/>
+          </a:xfrm>
+          <a:prstGeom prst="stripedRightArrow">
+            <a:avLst/>
+          </a:prstGeom>
+        </p:spPr>
+        <p:style>
+          <a:lnRef idx="2">
+            <a:schemeClr val="accent2">
+              <a:shade val="50000"/>
+            </a:schemeClr>
+          </a:lnRef>
+          <a:fillRef idx="1">
+            <a:schemeClr val="accent2"/>
+          </a:fillRef>
+          <a:effectRef idx="0">
+            <a:schemeClr val="accent2"/>
+          </a:effectRef>
+          <a:fontRef idx="minor">
+            <a:schemeClr val="lt1"/>
+          </a:fontRef>
+        </p:style>
+        <p:txBody>
+          <a:bodyPr rtlCol="0" anchor="ctr"/>
+          <a:p>
+            <a:pPr algn="ctr"/>
+            <a:endParaRPr lang="en-US"/>
+          </a:p>
+        </p:txBody>
+      </p:sp>
+      <p:sp>
+        <p:nvSpPr>
+          <p:cNvPr id="6" name="Striped Right Arrow 5"/>
+          <p:cNvSpPr/>
+          <p:nvPr/>
+        </p:nvSpPr>
+        <p:spPr>
+          <a:xfrm>
+            <a:off x="2707005" y="4789805"/>
+            <a:ext cx="6840220" cy="359410"/>
+          </a:xfrm>
+          <a:prstGeom prst="stripedRightArrow">
+            <a:avLst/>
+          </a:prstGeom>
+        </p:spPr>
+        <p:style>
+          <a:lnRef idx="2">
+            <a:schemeClr val="accent6">
+              <a:shade val="50000"/>
+            </a:schemeClr>
+          </a:lnRef>
+          <a:fillRef idx="1">
+            <a:schemeClr val="accent6"/>
+          </a:fillRef>
+          <a:effectRef idx="0">
+            <a:schemeClr val="accent6"/>
+          </a:effectRef>
+          <a:fontRef idx="minor">
+            <a:schemeClr val="lt1"/>
+          </a:fontRef>
+        </p:style>
+        <p:txBody>
+          <a:bodyPr rtlCol="0" anchor="ctr"/>
+          <a:p>
+            <a:pPr algn="ctr"/>
+            <a:endParaRPr lang="en-US"/>
+          </a:p>
+        </p:txBody>
+      </p:sp>
       <p:pic>
         <p:nvPicPr>
-          <p:cNvPr id="15" name="Picture 14" descr="Meteor_pub"/>
+          <p:cNvPr id="7" name="Picture 6" descr="laptop"/>
           <p:cNvPicPr>
             <a:picLocks noChangeAspect="1"/>
           </p:cNvPicPr>
@@ -2932,48 +3012,67 @@
         </p:blipFill>
         <p:spPr>
           <a:xfrm>
-            <a:off x="769620" y="1332230"/>
-            <a:ext cx="1944370" cy="2176145"/>
+            <a:off x="1134110" y="3856355"/>
+            <a:ext cx="1553210" cy="1739900"/>
           </a:xfrm>
           <a:prstGeom prst="rect">
             <a:avLst/>
           </a:prstGeom>
         </p:spPr>
       </p:pic>
-      <p:sp>
-        <p:nvSpPr>
-          <p:cNvPr id="4" name="Oval 3"/>
+      <p:pic>
+        <p:nvPicPr>
+          <p:cNvPr id="8" name="Picture 7" descr="server"/>
+          <p:cNvPicPr>
+            <a:picLocks noChangeAspect="1"/>
+          </p:cNvPicPr>
+          <p:nvPr/>
+        </p:nvPicPr>
+        <p:blipFill>
+          <a:blip r:embed="rId2"/>
+          <a:stretch>
+            <a:fillRect/>
+          </a:stretch>
+        </p:blipFill>
+        <p:spPr>
+          <a:xfrm>
+            <a:off x="1017905" y="1460500"/>
+            <a:ext cx="1570990" cy="1570990"/>
+          </a:xfrm>
+          <a:prstGeom prst="rect">
+            <a:avLst/>
+          </a:prstGeom>
+        </p:spPr>
+      </p:pic>
+      <p:sp>
+        <p:nvSpPr>
+          <p:cNvPr id="9" name="Striped Right Arrow 8"/>
           <p:cNvSpPr/>
           <p:nvPr/>
         </p:nvSpPr>
         <p:spPr>
-          <a:xfrm rot="2460000">
-            <a:off x="2272665" y="1849755"/>
-            <a:ext cx="5184140" cy="3686175"/>
-          </a:xfrm>
-          <a:prstGeom prst="ellipse">
+          <a:xfrm rot="17820000">
+            <a:off x="2082800" y="3314700"/>
+            <a:ext cx="2747010" cy="359410"/>
+          </a:xfrm>
+          <a:prstGeom prst="stripedRightArrow">
             <a:avLst/>
           </a:prstGeom>
-          <a:solidFill>
-            <a:schemeClr val="accent1">
-              <a:lumMod val="60000"/>
-              <a:lumOff val="40000"/>
-              <a:alpha val="47000"/>
-            </a:schemeClr>
-          </a:solidFill>
         </p:spPr>
         <p:style>
           <a:lnRef idx="2">
-            <a:schemeClr val="accent6"/>
+            <a:schemeClr val="accent4">
+              <a:shade val="50000"/>
+            </a:schemeClr>
           </a:lnRef>
           <a:fillRef idx="1">
-            <a:schemeClr val="lt1"/>
+            <a:schemeClr val="accent4"/>
           </a:fillRef>
           <a:effectRef idx="0">
-            <a:schemeClr val="accent6"/>
+            <a:schemeClr val="accent4"/>
           </a:effectRef>
           <a:fontRef idx="minor">
-            <a:schemeClr val="dk1"/>
+            <a:schemeClr val="lt1"/>
           </a:fontRef>
         </p:style>
         <p:txBody>
@@ -2986,23 +3085,18 @@
       </p:sp>
       <p:sp>
         <p:nvSpPr>
-          <p:cNvPr id="6" name="Oval 5"/>
+          <p:cNvPr id="10" name="Striped Right Arrow 9"/>
           <p:cNvSpPr/>
           <p:nvPr/>
         </p:nvSpPr>
         <p:spPr>
-          <a:xfrm rot="2580000">
-            <a:off x="2679700" y="2275840"/>
-            <a:ext cx="2777490" cy="1493520"/>
-          </a:xfrm>
-          <a:prstGeom prst="ellipse">
+          <a:xfrm rot="4020000">
+            <a:off x="3502660" y="3375660"/>
+            <a:ext cx="2747010" cy="359410"/>
+          </a:xfrm>
+          <a:prstGeom prst="stripedRightArrow">
             <a:avLst/>
           </a:prstGeom>
-          <a:solidFill>
-            <a:schemeClr val="accent6">
-              <a:alpha val="56000"/>
-            </a:schemeClr>
-          </a:solidFill>
         </p:spPr>
         <p:style>
           <a:lnRef idx="2">
@@ -3030,23 +3124,115 @@
       </p:sp>
       <p:sp>
         <p:nvSpPr>
-          <p:cNvPr id="7" name="Oval 6"/>
+          <p:cNvPr id="11" name="Text Box 10"/>
+          <p:cNvSpPr txBox="1"/>
+          <p:nvPr/>
+        </p:nvSpPr>
+        <p:spPr>
+          <a:xfrm rot="17880000">
+            <a:off x="2187575" y="3244215"/>
+            <a:ext cx="2022475" cy="365760"/>
+          </a:xfrm>
+          <a:prstGeom prst="rect">
+            <a:avLst/>
+          </a:prstGeom>
+          <a:noFill/>
+        </p:spPr>
+        <p:txBody>
+          <a:bodyPr wrap="square" rtlCol="0">
+            <a:spAutoFit/>
+          </a:bodyPr>
+          <a:p>
+            <a:r>
+              <a:rPr lang="x-none" altLang="en-US" b="1"/>
+              <a:t>initial page request</a:t>
+            </a:r>
+            <a:endParaRPr lang="x-none" altLang="en-US" b="1"/>
+          </a:p>
+        </p:txBody>
+      </p:sp>
+      <p:sp>
+        <p:nvSpPr>
+          <p:cNvPr id="12" name="Text Box 11"/>
+          <p:cNvSpPr txBox="1"/>
+          <p:nvPr/>
+        </p:nvSpPr>
+        <p:spPr>
+          <a:xfrm rot="4080000">
+            <a:off x="3599180" y="3493135"/>
+            <a:ext cx="2022475" cy="365760"/>
+          </a:xfrm>
+          <a:prstGeom prst="rect">
+            <a:avLst/>
+          </a:prstGeom>
+          <a:noFill/>
+        </p:spPr>
+        <p:txBody>
+          <a:bodyPr wrap="square" rtlCol="0">
+            <a:spAutoFit/>
+          </a:bodyPr>
+          <a:p>
+            <a:r>
+              <a:rPr lang="x-none" altLang="en-US" b="1"/>
+              <a:t>server sends page</a:t>
+            </a:r>
+            <a:endParaRPr lang="x-none" altLang="en-US" b="1"/>
+          </a:p>
+        </p:txBody>
+      </p:sp>
+      <p:sp>
+        <p:nvSpPr>
+          <p:cNvPr id="13" name="Striped Right Arrow 12"/>
           <p:cNvSpPr/>
           <p:nvPr/>
         </p:nvSpPr>
         <p:spPr>
-          <a:xfrm>
-            <a:off x="3975735" y="2957830"/>
-            <a:ext cx="2804795" cy="2606675"/>
-          </a:xfrm>
-          <a:prstGeom prst="ellipse">
+          <a:xfrm rot="17820000">
+            <a:off x="5813425" y="3272155"/>
+            <a:ext cx="2747010" cy="359410"/>
+          </a:xfrm>
+          <a:prstGeom prst="stripedRightArrow">
             <a:avLst/>
           </a:prstGeom>
-          <a:solidFill>
-            <a:schemeClr val="accent2">
-              <a:alpha val="49000"/>
+        </p:spPr>
+        <p:style>
+          <a:lnRef idx="2">
+            <a:schemeClr val="accent4">
+              <a:shade val="50000"/>
             </a:schemeClr>
-          </a:solidFill>
+          </a:lnRef>
+          <a:fillRef idx="1">
+            <a:schemeClr val="accent4"/>
+          </a:fillRef>
+          <a:effectRef idx="0">
+            <a:schemeClr val="accent4"/>
+          </a:effectRef>
+          <a:fontRef idx="minor">
+            <a:schemeClr val="lt1"/>
+          </a:fontRef>
+        </p:style>
+        <p:txBody>
+          <a:bodyPr rtlCol="0" anchor="ctr"/>
+          <a:p>
+            <a:pPr algn="ctr"/>
+            <a:endParaRPr lang="en-US"/>
+          </a:p>
+        </p:txBody>
+      </p:sp>
+      <p:sp>
+        <p:nvSpPr>
+          <p:cNvPr id="14" name="Striped Right Arrow 13"/>
+          <p:cNvSpPr/>
+          <p:nvPr/>
+        </p:nvSpPr>
+        <p:spPr>
+          <a:xfrm rot="4020000">
+            <a:off x="7233285" y="3333115"/>
+            <a:ext cx="2747010" cy="359410"/>
+          </a:xfrm>
+          <a:prstGeom prst="stripedRightArrow">
+            <a:avLst/>
+          </a:prstGeom>
         </p:spPr>
         <p:style>
           <a:lnRef idx="2">
@@ -3074,14 +3260,14 @@
       </p:sp>
       <p:sp>
         <p:nvSpPr>
-          <p:cNvPr id="8" name="Text Box 7"/>
+          <p:cNvPr id="15" name="Text Box 14"/>
           <p:cNvSpPr txBox="1"/>
           <p:nvPr/>
         </p:nvSpPr>
         <p:spPr>
-          <a:xfrm>
-            <a:off x="4853940" y="1993265"/>
-            <a:ext cx="1284605" cy="914400"/>
+          <a:xfrm rot="17880000">
+            <a:off x="5692775" y="3170555"/>
+            <a:ext cx="2505710" cy="365760"/>
           </a:xfrm>
           <a:prstGeom prst="rect">
             <a:avLst/>
@@ -3094,28 +3280,323 @@
           </a:bodyPr>
           <a:p>
             <a:r>
-              <a:rPr lang="x-none" altLang="en-US" sz="5400" b="1">
-                <a:solidFill>
-                  <a:schemeClr val="accent1">
-                    <a:lumMod val="75000"/>
-                  </a:schemeClr>
-                </a:solidFill>
+              <a:rPr lang="x-none" altLang="en-US" b="1"/>
+              <a:t>client requests new page</a:t>
+            </a:r>
+            <a:endParaRPr lang="x-none" altLang="en-US" b="1"/>
+          </a:p>
+        </p:txBody>
+      </p:sp>
+      <p:sp>
+        <p:nvSpPr>
+          <p:cNvPr id="16" name="Text Box 15"/>
+          <p:cNvSpPr txBox="1"/>
+          <p:nvPr/>
+        </p:nvSpPr>
+        <p:spPr>
+          <a:xfrm rot="4080000">
+            <a:off x="7329805" y="3450590"/>
+            <a:ext cx="2022475" cy="365760"/>
+          </a:xfrm>
+          <a:prstGeom prst="rect">
+            <a:avLst/>
+          </a:prstGeom>
+          <a:noFill/>
+        </p:spPr>
+        <p:txBody>
+          <a:bodyPr wrap="square" rtlCol="0">
+            <a:spAutoFit/>
+          </a:bodyPr>
+          <a:p>
+            <a:r>
+              <a:rPr lang="x-none" altLang="en-US" b="1"/>
+              <a:t>server sends page</a:t>
+            </a:r>
+            <a:endParaRPr lang="x-none" altLang="en-US" b="1"/>
+          </a:p>
+        </p:txBody>
+      </p:sp>
+      <p:sp>
+        <p:nvSpPr>
+          <p:cNvPr id="17" name="Text Box 16"/>
+          <p:cNvSpPr txBox="1"/>
+          <p:nvPr/>
+        </p:nvSpPr>
+        <p:spPr>
+          <a:xfrm>
+            <a:off x="4850130" y="5020310"/>
+            <a:ext cx="2324100" cy="365760"/>
+          </a:xfrm>
+          <a:prstGeom prst="rect">
+            <a:avLst/>
+          </a:prstGeom>
+          <a:noFill/>
+        </p:spPr>
+        <p:txBody>
+          <a:bodyPr wrap="square" rtlCol="0">
+            <a:spAutoFit/>
+          </a:bodyPr>
+          <a:p>
+            <a:r>
+              <a:rPr lang="x-none" altLang="en-US"/>
+              <a:t>user interacts with page</a:t>
+            </a:r>
+            <a:endParaRPr lang="x-none" altLang="en-US"/>
+          </a:p>
+        </p:txBody>
+      </p:sp>
+      <p:sp>
+        <p:nvSpPr>
+          <p:cNvPr id="18" name="Text Box 17"/>
+          <p:cNvSpPr txBox="1"/>
+          <p:nvPr/>
+        </p:nvSpPr>
+        <p:spPr>
+          <a:xfrm>
+            <a:off x="1325880" y="774065"/>
+            <a:ext cx="8251825" cy="579120"/>
+          </a:xfrm>
+          <a:prstGeom prst="rect">
+            <a:avLst/>
+          </a:prstGeom>
+          <a:noFill/>
+        </p:spPr>
+        <p:txBody>
+          <a:bodyPr wrap="square" rtlCol="0">
+            <a:spAutoFit/>
+          </a:bodyPr>
+          <a:p>
+            <a:r>
+              <a:rPr lang="x-none" altLang="en-US" sz="3200">
+                <a:latin typeface="+mn-ea"/>
               </a:rPr>
-              <a:t>DB</a:t>
-            </a:r>
-            <a:endParaRPr lang="x-none" altLang="en-US" sz="5400" b="1">
-              <a:solidFill>
-                <a:schemeClr val="accent1">
-                  <a:lumMod val="75000"/>
-                </a:schemeClr>
-              </a:solidFill>
+              <a:t>Traditional request / response model &lt; 2005</a:t>
+            </a:r>
+            <a:endParaRPr lang="x-none" altLang="en-US" sz="3200">
+              <a:latin typeface="+mn-ea"/>
             </a:endParaRPr>
           </a:p>
         </p:txBody>
       </p:sp>
       <p:pic>
         <p:nvPicPr>
-          <p:cNvPr id="10" name="Picture 9" descr="computer-1331579_960_720"/>
+          <p:cNvPr id="19" name="Picture 18" descr="computer-1331579_960_720"/>
+          <p:cNvPicPr>
+            <a:picLocks noChangeAspect="1"/>
+          </p:cNvPicPr>
+          <p:nvPr/>
+        </p:nvPicPr>
+        <p:blipFill>
+          <a:blip r:embed="rId3"/>
+          <a:stretch>
+            <a:fillRect/>
+          </a:stretch>
+        </p:blipFill>
+        <p:spPr>
+          <a:xfrm>
+            <a:off x="5523865" y="4070985"/>
+            <a:ext cx="784225" cy="784225"/>
+          </a:xfrm>
+          <a:prstGeom prst="rect">
+            <a:avLst/>
+          </a:prstGeom>
+        </p:spPr>
+      </p:pic>
+      <p:pic>
+        <p:nvPicPr>
+          <p:cNvPr id="20" name="Picture 19" descr="html"/>
+          <p:cNvPicPr>
+            <a:picLocks noChangeAspect="1"/>
+          </p:cNvPicPr>
+          <p:nvPr/>
+        </p:nvPicPr>
+        <p:blipFill>
+          <a:blip r:embed="rId4"/>
+          <a:stretch>
+            <a:fillRect/>
+          </a:stretch>
+        </p:blipFill>
+        <p:spPr>
+          <a:xfrm>
+            <a:off x="4999355" y="3052445"/>
+            <a:ext cx="654685" cy="654685"/>
+          </a:xfrm>
+          <a:prstGeom prst="rect">
+            <a:avLst/>
+          </a:prstGeom>
+        </p:spPr>
+      </p:pic>
+      <p:pic>
+        <p:nvPicPr>
+          <p:cNvPr id="21" name="Picture 20" descr="html"/>
+          <p:cNvPicPr>
+            <a:picLocks noChangeAspect="1"/>
+          </p:cNvPicPr>
+          <p:nvPr/>
+        </p:nvPicPr>
+        <p:blipFill>
+          <a:blip r:embed="rId5"/>
+          <a:stretch>
+            <a:fillRect/>
+          </a:stretch>
+        </p:blipFill>
+        <p:spPr>
+          <a:xfrm>
+            <a:off x="8745855" y="3061335"/>
+            <a:ext cx="654685" cy="654685"/>
+          </a:xfrm>
+          <a:prstGeom prst="rect">
+            <a:avLst/>
+          </a:prstGeom>
+        </p:spPr>
+      </p:pic>
+      <p:pic>
+        <p:nvPicPr>
+          <p:cNvPr id="22" name="Picture 21" descr="curved_arrow"/>
+          <p:cNvPicPr>
+            <a:picLocks noChangeAspect="1"/>
+          </p:cNvPicPr>
+          <p:nvPr/>
+        </p:nvPicPr>
+        <p:blipFill>
+          <a:blip r:embed="rId6"/>
+          <a:stretch>
+            <a:fillRect/>
+          </a:stretch>
+        </p:blipFill>
+        <p:spPr>
+          <a:xfrm rot="20400000">
+            <a:off x="5403215" y="3860165"/>
+            <a:ext cx="1050290" cy="472440"/>
+          </a:xfrm>
+          <a:prstGeom prst="rect">
+            <a:avLst/>
+          </a:prstGeom>
+        </p:spPr>
+      </p:pic>
+    </p:spTree>
+  </p:cSld>
+  <p:clrMapOvr>
+    <a:masterClrMapping/>
+  </p:clrMapOvr>
+</p:sld>
+</file>
+
+<file path=ppt/slides/slide2.xml><?xml version="1.0" encoding="utf-8"?>
+<p:sld xmlns:a="http://schemas.openxmlformats.org/drawingml/2006/main" xmlns:r="http://schemas.openxmlformats.org/officeDocument/2006/relationships" xmlns:p="http://schemas.openxmlformats.org/presentationml/2006/main">
+  <p:cSld>
+    <p:spTree>
+      <p:nvGrpSpPr>
+        <p:cNvPr id="1" name=""/>
+        <p:cNvGrpSpPr/>
+        <p:nvPr/>
+      </p:nvGrpSpPr>
+      <p:grpSpPr/>
+      <p:sp>
+        <p:nvSpPr>
+          <p:cNvPr id="4" name="Striped Right Arrow 3"/>
+          <p:cNvSpPr/>
+          <p:nvPr/>
+        </p:nvSpPr>
+        <p:spPr>
+          <a:xfrm>
+            <a:off x="2692400" y="1837055"/>
+            <a:ext cx="6896735" cy="359410"/>
+          </a:xfrm>
+          <a:prstGeom prst="stripedRightArrow">
+            <a:avLst/>
+          </a:prstGeom>
+        </p:spPr>
+        <p:style>
+          <a:lnRef idx="2">
+            <a:schemeClr val="accent2">
+              <a:shade val="50000"/>
+            </a:schemeClr>
+          </a:lnRef>
+          <a:fillRef idx="1">
+            <a:schemeClr val="accent2"/>
+          </a:fillRef>
+          <a:effectRef idx="0">
+            <a:schemeClr val="accent2"/>
+          </a:effectRef>
+          <a:fontRef idx="minor">
+            <a:schemeClr val="lt1"/>
+          </a:fontRef>
+        </p:style>
+        <p:txBody>
+          <a:bodyPr rtlCol="0" anchor="ctr"/>
+          <a:p>
+            <a:pPr algn="ctr"/>
+            <a:endParaRPr lang="en-US"/>
+          </a:p>
+        </p:txBody>
+      </p:sp>
+      <p:sp>
+        <p:nvSpPr>
+          <p:cNvPr id="6" name="Striped Right Arrow 5"/>
+          <p:cNvSpPr/>
+          <p:nvPr/>
+        </p:nvSpPr>
+        <p:spPr>
+          <a:xfrm>
+            <a:off x="2707005" y="4789805"/>
+            <a:ext cx="6840220" cy="359410"/>
+          </a:xfrm>
+          <a:prstGeom prst="stripedRightArrow">
+            <a:avLst/>
+          </a:prstGeom>
+        </p:spPr>
+        <p:style>
+          <a:lnRef idx="2">
+            <a:schemeClr val="accent6">
+              <a:shade val="50000"/>
+            </a:schemeClr>
+          </a:lnRef>
+          <a:fillRef idx="1">
+            <a:schemeClr val="accent6"/>
+          </a:fillRef>
+          <a:effectRef idx="0">
+            <a:schemeClr val="accent6"/>
+          </a:effectRef>
+          <a:fontRef idx="minor">
+            <a:schemeClr val="lt1"/>
+          </a:fontRef>
+        </p:style>
+        <p:txBody>
+          <a:bodyPr rtlCol="0" anchor="ctr"/>
+          <a:p>
+            <a:pPr algn="ctr"/>
+            <a:endParaRPr lang="en-US"/>
+          </a:p>
+        </p:txBody>
+      </p:sp>
+      <p:pic>
+        <p:nvPicPr>
+          <p:cNvPr id="7" name="Picture 6" descr="laptop"/>
+          <p:cNvPicPr>
+            <a:picLocks noChangeAspect="1"/>
+          </p:cNvPicPr>
+          <p:nvPr/>
+        </p:nvPicPr>
+        <p:blipFill>
+          <a:blip r:embed="rId1"/>
+          <a:stretch>
+            <a:fillRect/>
+          </a:stretch>
+        </p:blipFill>
+        <p:spPr>
+          <a:xfrm>
+            <a:off x="1134110" y="3856355"/>
+            <a:ext cx="1553210" cy="1739900"/>
+          </a:xfrm>
+          <a:prstGeom prst="rect">
+            <a:avLst/>
+          </a:prstGeom>
+        </p:spPr>
+      </p:pic>
+      <p:pic>
+        <p:nvPicPr>
+          <p:cNvPr id="8" name="Picture 7" descr="server"/>
           <p:cNvPicPr>
             <a:picLocks noChangeAspect="1"/>
           </p:cNvPicPr>
@@ -3129,31 +3610,896 @@
         </p:blipFill>
         <p:spPr>
           <a:xfrm>
-            <a:off x="886460" y="4126230"/>
-            <a:ext cx="1559560" cy="1559560"/>
+            <a:off x="1017905" y="1460500"/>
+            <a:ext cx="1570990" cy="1570990"/>
           </a:xfrm>
           <a:prstGeom prst="rect">
             <a:avLst/>
           </a:prstGeom>
         </p:spPr>
       </p:pic>
-      <p:sp>
-        <p:nvSpPr>
-          <p:cNvPr id="11" name="Striped Right Arrow 10"/>
+      <p:grpSp>
+        <p:nvGrpSpPr>
+          <p:cNvPr id="3" name="Group 2"/>
+          <p:cNvGrpSpPr/>
+          <p:nvPr/>
+        </p:nvGrpSpPr>
+        <p:grpSpPr>
+          <a:xfrm rot="20520000">
+            <a:off x="2679700" y="2159635"/>
+            <a:ext cx="620395" cy="2747010"/>
+            <a:chOff x="4749" y="3340"/>
+            <a:chExt cx="977" cy="4326"/>
+          </a:xfrm>
+        </p:grpSpPr>
+        <p:sp>
+          <p:nvSpPr>
+            <p:cNvPr id="9" name="Striped Right Arrow 8"/>
+            <p:cNvSpPr/>
+            <p:nvPr/>
+          </p:nvSpPr>
+          <p:spPr>
+            <a:xfrm rot="17820000">
+              <a:off x="3280" y="5220"/>
+              <a:ext cx="4326" cy="566"/>
+            </a:xfrm>
+            <a:prstGeom prst="stripedRightArrow">
+              <a:avLst/>
+            </a:prstGeom>
+          </p:spPr>
+          <p:style>
+            <a:lnRef idx="2">
+              <a:schemeClr val="accent4">
+                <a:shade val="50000"/>
+              </a:schemeClr>
+            </a:lnRef>
+            <a:fillRef idx="1">
+              <a:schemeClr val="accent4"/>
+            </a:fillRef>
+            <a:effectRef idx="0">
+              <a:schemeClr val="accent4"/>
+            </a:effectRef>
+            <a:fontRef idx="minor">
+              <a:schemeClr val="lt1"/>
+            </a:fontRef>
+          </p:style>
+          <p:txBody>
+            <a:bodyPr rtlCol="0" anchor="ctr"/>
+            <a:p>
+              <a:pPr algn="ctr"/>
+              <a:endParaRPr lang="en-US"/>
+            </a:p>
+          </p:txBody>
+        </p:sp>
+        <p:sp>
+          <p:nvSpPr>
+            <p:cNvPr id="11" name="Text Box 10"/>
+            <p:cNvSpPr txBox="1"/>
+            <p:nvPr/>
+          </p:nvSpPr>
+          <p:spPr>
+            <a:xfrm rot="17880000">
+              <a:off x="3445" y="5109"/>
+              <a:ext cx="3185" cy="576"/>
+            </a:xfrm>
+            <a:prstGeom prst="rect">
+              <a:avLst/>
+            </a:prstGeom>
+            <a:noFill/>
+          </p:spPr>
+          <p:txBody>
+            <a:bodyPr wrap="square" rtlCol="0">
+              <a:spAutoFit/>
+            </a:bodyPr>
+            <a:p>
+              <a:r>
+                <a:rPr lang="x-none" altLang="en-US" b="1"/>
+                <a:t>initial page request</a:t>
+              </a:r>
+              <a:endParaRPr lang="x-none" altLang="en-US" b="1"/>
+            </a:p>
+          </p:txBody>
+        </p:sp>
+      </p:grpSp>
+      <p:grpSp>
+        <p:nvGrpSpPr>
+          <p:cNvPr id="5" name="Group 4"/>
+          <p:cNvGrpSpPr/>
+          <p:nvPr/>
+        </p:nvGrpSpPr>
+        <p:grpSpPr>
+          <a:xfrm rot="660000">
+            <a:off x="3568065" y="2123440"/>
+            <a:ext cx="628650" cy="2747010"/>
+            <a:chOff x="6972" y="3436"/>
+            <a:chExt cx="990" cy="4326"/>
+          </a:xfrm>
+        </p:grpSpPr>
+        <p:sp>
+          <p:nvSpPr>
+            <p:cNvPr id="10" name="Striped Right Arrow 9"/>
+            <p:cNvSpPr/>
+            <p:nvPr/>
+          </p:nvSpPr>
+          <p:spPr>
+            <a:xfrm rot="4020000">
+              <a:off x="5516" y="5316"/>
+              <a:ext cx="4326" cy="566"/>
+            </a:xfrm>
+            <a:prstGeom prst="stripedRightArrow">
+              <a:avLst/>
+            </a:prstGeom>
+          </p:spPr>
+          <p:style>
+            <a:lnRef idx="2">
+              <a:schemeClr val="accent1">
+                <a:shade val="50000"/>
+              </a:schemeClr>
+            </a:lnRef>
+            <a:fillRef idx="1">
+              <a:schemeClr val="accent1"/>
+            </a:fillRef>
+            <a:effectRef idx="0">
+              <a:schemeClr val="accent1"/>
+            </a:effectRef>
+            <a:fontRef idx="minor">
+              <a:schemeClr val="lt1"/>
+            </a:fontRef>
+          </p:style>
+          <p:txBody>
+            <a:bodyPr rtlCol="0" anchor="ctr"/>
+            <a:p>
+              <a:pPr algn="ctr"/>
+              <a:endParaRPr lang="en-US"/>
+            </a:p>
+          </p:txBody>
+        </p:sp>
+        <p:sp>
+          <p:nvSpPr>
+            <p:cNvPr id="12" name="Text Box 11"/>
+            <p:cNvSpPr txBox="1"/>
+            <p:nvPr/>
+          </p:nvSpPr>
+          <p:spPr>
+            <a:xfrm rot="4080000">
+              <a:off x="5668" y="5501"/>
+              <a:ext cx="3185" cy="576"/>
+            </a:xfrm>
+            <a:prstGeom prst="rect">
+              <a:avLst/>
+            </a:prstGeom>
+            <a:noFill/>
+          </p:spPr>
+          <p:txBody>
+            <a:bodyPr wrap="square" rtlCol="0">
+              <a:spAutoFit/>
+            </a:bodyPr>
+            <a:p>
+              <a:r>
+                <a:rPr lang="x-none" altLang="en-US" b="1"/>
+                <a:t>server sends page</a:t>
+              </a:r>
+              <a:endParaRPr lang="x-none" altLang="en-US" b="1"/>
+            </a:p>
+          </p:txBody>
+        </p:sp>
+      </p:grpSp>
+      <p:sp>
+        <p:nvSpPr>
+          <p:cNvPr id="17" name="Text Box 16"/>
+          <p:cNvSpPr txBox="1"/>
+          <p:nvPr/>
+        </p:nvSpPr>
+        <p:spPr>
+          <a:xfrm>
+            <a:off x="4850130" y="5020310"/>
+            <a:ext cx="2324100" cy="365760"/>
+          </a:xfrm>
+          <a:prstGeom prst="rect">
+            <a:avLst/>
+          </a:prstGeom>
+          <a:noFill/>
+        </p:spPr>
+        <p:txBody>
+          <a:bodyPr wrap="square" rtlCol="0">
+            <a:spAutoFit/>
+          </a:bodyPr>
+          <a:p>
+            <a:r>
+              <a:rPr lang="x-none" altLang="en-US"/>
+              <a:t>this goes on forever...</a:t>
+            </a:r>
+            <a:endParaRPr lang="x-none" altLang="en-US"/>
+          </a:p>
+        </p:txBody>
+      </p:sp>
+      <p:sp>
+        <p:nvSpPr>
+          <p:cNvPr id="18" name="Text Box 17"/>
+          <p:cNvSpPr txBox="1"/>
+          <p:nvPr/>
+        </p:nvSpPr>
+        <p:spPr>
+          <a:xfrm>
+            <a:off x="1325880" y="774065"/>
+            <a:ext cx="8732520" cy="579120"/>
+          </a:xfrm>
+          <a:prstGeom prst="rect">
+            <a:avLst/>
+          </a:prstGeom>
+          <a:noFill/>
+        </p:spPr>
+        <p:txBody>
+          <a:bodyPr wrap="square" rtlCol="0">
+            <a:spAutoFit/>
+          </a:bodyPr>
+          <a:p>
+            <a:r>
+              <a:rPr lang="x-none" altLang="en-US" sz="3200">
+                <a:latin typeface="+mn-ea"/>
+              </a:rPr>
+              <a:t>Longpolling via Ajax 2005 - 2012 (&amp; still in use)</a:t>
+            </a:r>
+            <a:endParaRPr lang="x-none" altLang="en-US" sz="3200">
+              <a:latin typeface="+mn-ea"/>
+            </a:endParaRPr>
+          </a:p>
+        </p:txBody>
+      </p:sp>
+      <p:pic>
+        <p:nvPicPr>
+          <p:cNvPr id="20" name="Picture 19" descr="html"/>
+          <p:cNvPicPr>
+            <a:picLocks noChangeAspect="1"/>
+          </p:cNvPicPr>
+          <p:nvPr/>
+        </p:nvPicPr>
+        <p:blipFill>
+          <a:blip r:embed="rId3"/>
+          <a:stretch>
+            <a:fillRect/>
+          </a:stretch>
+        </p:blipFill>
+        <p:spPr>
+          <a:xfrm>
+            <a:off x="4029710" y="3128645"/>
+            <a:ext cx="654685" cy="654685"/>
+          </a:xfrm>
+          <a:prstGeom prst="rect">
+            <a:avLst/>
+          </a:prstGeom>
+        </p:spPr>
+      </p:pic>
+      <p:pic>
+        <p:nvPicPr>
+          <p:cNvPr id="2" name="Picture 1" descr="json"/>
+          <p:cNvPicPr>
+            <a:picLocks noChangeAspect="1"/>
+          </p:cNvPicPr>
+          <p:nvPr/>
+        </p:nvPicPr>
+        <p:blipFill>
+          <a:blip r:embed="rId4"/>
+          <a:stretch>
+            <a:fillRect/>
+          </a:stretch>
+        </p:blipFill>
+        <p:spPr>
+          <a:xfrm>
+            <a:off x="9402445" y="3049270"/>
+            <a:ext cx="787400" cy="787400"/>
+          </a:xfrm>
+          <a:prstGeom prst="rect">
+            <a:avLst/>
+          </a:prstGeom>
+        </p:spPr>
+      </p:pic>
+      <p:grpSp>
+        <p:nvGrpSpPr>
+          <p:cNvPr id="23" name="Group 22"/>
+          <p:cNvGrpSpPr/>
+          <p:nvPr/>
+        </p:nvGrpSpPr>
+        <p:grpSpPr>
+          <a:xfrm rot="20520000">
+            <a:off x="4622784" y="2163347"/>
+            <a:ext cx="619760" cy="2747010"/>
+            <a:chOff x="4750" y="3340"/>
+            <a:chExt cx="976" cy="4326"/>
+          </a:xfrm>
+        </p:grpSpPr>
+        <p:sp>
+          <p:nvSpPr>
+            <p:cNvPr id="24" name="Striped Right Arrow 23"/>
+            <p:cNvSpPr/>
+            <p:nvPr/>
+          </p:nvSpPr>
+          <p:spPr>
+            <a:xfrm rot="17820000">
+              <a:off x="3280" y="5220"/>
+              <a:ext cx="4326" cy="566"/>
+            </a:xfrm>
+            <a:prstGeom prst="stripedRightArrow">
+              <a:avLst/>
+            </a:prstGeom>
+          </p:spPr>
+          <p:style>
+            <a:lnRef idx="2">
+              <a:schemeClr val="accent4">
+                <a:shade val="50000"/>
+              </a:schemeClr>
+            </a:lnRef>
+            <a:fillRef idx="1">
+              <a:schemeClr val="accent4"/>
+            </a:fillRef>
+            <a:effectRef idx="0">
+              <a:schemeClr val="accent4"/>
+            </a:effectRef>
+            <a:fontRef idx="minor">
+              <a:schemeClr val="lt1"/>
+            </a:fontRef>
+          </p:style>
+          <p:txBody>
+            <a:bodyPr rtlCol="0" anchor="ctr"/>
+            <a:p>
+              <a:pPr algn="ctr"/>
+              <a:endParaRPr lang="en-US"/>
+            </a:p>
+          </p:txBody>
+        </p:sp>
+        <p:sp>
+          <p:nvSpPr>
+            <p:cNvPr id="25" name="Text Box 24"/>
+            <p:cNvSpPr txBox="1"/>
+            <p:nvPr/>
+          </p:nvSpPr>
+          <p:spPr>
+            <a:xfrm rot="17880000">
+              <a:off x="3445" y="5109"/>
+              <a:ext cx="3185" cy="576"/>
+            </a:xfrm>
+            <a:prstGeom prst="rect">
+              <a:avLst/>
+            </a:prstGeom>
+            <a:noFill/>
+          </p:spPr>
+          <p:txBody>
+            <a:bodyPr wrap="square" rtlCol="0">
+              <a:spAutoFit/>
+            </a:bodyPr>
+            <a:p>
+              <a:r>
+                <a:rPr lang="x-none" altLang="en-US" b="1"/>
+                <a:t>are there new data?</a:t>
+              </a:r>
+              <a:endParaRPr lang="x-none" altLang="en-US" b="1"/>
+            </a:p>
+          </p:txBody>
+        </p:sp>
+      </p:grpSp>
+      <p:grpSp>
+        <p:nvGrpSpPr>
+          <p:cNvPr id="26" name="Group 25"/>
+          <p:cNvGrpSpPr/>
+          <p:nvPr/>
+        </p:nvGrpSpPr>
+        <p:grpSpPr>
+          <a:xfrm rot="660000">
+            <a:off x="5511159" y="2127311"/>
+            <a:ext cx="628015" cy="2747010"/>
+            <a:chOff x="6973" y="3436"/>
+            <a:chExt cx="989" cy="4326"/>
+          </a:xfrm>
+        </p:grpSpPr>
+        <p:sp>
+          <p:nvSpPr>
+            <p:cNvPr id="27" name="Striped Right Arrow 26"/>
+            <p:cNvSpPr/>
+            <p:nvPr/>
+          </p:nvSpPr>
+          <p:spPr>
+            <a:xfrm rot="4020000">
+              <a:off x="5516" y="5316"/>
+              <a:ext cx="4326" cy="566"/>
+            </a:xfrm>
+            <a:prstGeom prst="stripedRightArrow">
+              <a:avLst/>
+            </a:prstGeom>
+          </p:spPr>
+          <p:style>
+            <a:lnRef idx="2">
+              <a:schemeClr val="accent1">
+                <a:shade val="50000"/>
+              </a:schemeClr>
+            </a:lnRef>
+            <a:fillRef idx="1">
+              <a:schemeClr val="accent1"/>
+            </a:fillRef>
+            <a:effectRef idx="0">
+              <a:schemeClr val="accent1"/>
+            </a:effectRef>
+            <a:fontRef idx="minor">
+              <a:schemeClr val="lt1"/>
+            </a:fontRef>
+          </p:style>
+          <p:txBody>
+            <a:bodyPr rtlCol="0" anchor="ctr"/>
+            <a:p>
+              <a:pPr algn="ctr"/>
+              <a:endParaRPr lang="en-US"/>
+            </a:p>
+          </p:txBody>
+        </p:sp>
+        <p:sp>
+          <p:nvSpPr>
+            <p:cNvPr id="28" name="Text Box 27"/>
+            <p:cNvSpPr txBox="1"/>
+            <p:nvPr/>
+          </p:nvSpPr>
+          <p:spPr>
+            <a:xfrm rot="4080000">
+              <a:off x="5668" y="5501"/>
+              <a:ext cx="3185" cy="576"/>
+            </a:xfrm>
+            <a:prstGeom prst="rect">
+              <a:avLst/>
+            </a:prstGeom>
+            <a:noFill/>
+          </p:spPr>
+          <p:txBody>
+            <a:bodyPr wrap="square" rtlCol="0">
+              <a:spAutoFit/>
+            </a:bodyPr>
+            <a:p>
+              <a:pPr lvl="1"/>
+              <a:r>
+                <a:rPr lang="x-none" altLang="en-US" b="1"/>
+                <a:t>     NO</a:t>
+              </a:r>
+              <a:endParaRPr lang="x-none" altLang="en-US" b="1"/>
+            </a:p>
+          </p:txBody>
+        </p:sp>
+      </p:grpSp>
+      <p:grpSp>
+        <p:nvGrpSpPr>
+          <p:cNvPr id="29" name="Group 28"/>
+          <p:cNvGrpSpPr/>
+          <p:nvPr/>
+        </p:nvGrpSpPr>
+        <p:grpSpPr>
+          <a:xfrm rot="20520000">
+            <a:off x="6386814" y="2163982"/>
+            <a:ext cx="619760" cy="2747010"/>
+            <a:chOff x="4750" y="3340"/>
+            <a:chExt cx="976" cy="4326"/>
+          </a:xfrm>
+        </p:grpSpPr>
+        <p:sp>
+          <p:nvSpPr>
+            <p:cNvPr id="30" name="Striped Right Arrow 29"/>
+            <p:cNvSpPr/>
+            <p:nvPr/>
+          </p:nvSpPr>
+          <p:spPr>
+            <a:xfrm rot="17820000">
+              <a:off x="3280" y="5220"/>
+              <a:ext cx="4326" cy="566"/>
+            </a:xfrm>
+            <a:prstGeom prst="stripedRightArrow">
+              <a:avLst/>
+            </a:prstGeom>
+          </p:spPr>
+          <p:style>
+            <a:lnRef idx="2">
+              <a:schemeClr val="accent4">
+                <a:shade val="50000"/>
+              </a:schemeClr>
+            </a:lnRef>
+            <a:fillRef idx="1">
+              <a:schemeClr val="accent4"/>
+            </a:fillRef>
+            <a:effectRef idx="0">
+              <a:schemeClr val="accent4"/>
+            </a:effectRef>
+            <a:fontRef idx="minor">
+              <a:schemeClr val="lt1"/>
+            </a:fontRef>
+          </p:style>
+          <p:txBody>
+            <a:bodyPr rtlCol="0" anchor="ctr"/>
+            <a:p>
+              <a:pPr algn="ctr"/>
+              <a:endParaRPr lang="en-US"/>
+            </a:p>
+          </p:txBody>
+        </p:sp>
+        <p:sp>
+          <p:nvSpPr>
+            <p:cNvPr id="31" name="Text Box 30"/>
+            <p:cNvSpPr txBox="1"/>
+            <p:nvPr/>
+          </p:nvSpPr>
+          <p:spPr>
+            <a:xfrm rot="17880000">
+              <a:off x="3445" y="5109"/>
+              <a:ext cx="3185" cy="576"/>
+            </a:xfrm>
+            <a:prstGeom prst="rect">
+              <a:avLst/>
+            </a:prstGeom>
+            <a:noFill/>
+          </p:spPr>
+          <p:txBody>
+            <a:bodyPr wrap="square" rtlCol="0">
+              <a:spAutoFit/>
+            </a:bodyPr>
+            <a:p>
+              <a:r>
+                <a:rPr lang="x-none" altLang="en-US" b="1">
+                  <a:sym typeface="+mn-ea"/>
+                </a:rPr>
+                <a:t>are there new data?</a:t>
+              </a:r>
+              <a:endParaRPr lang="x-none" altLang="en-US" b="1"/>
+            </a:p>
+          </p:txBody>
+        </p:sp>
+      </p:grpSp>
+      <p:grpSp>
+        <p:nvGrpSpPr>
+          <p:cNvPr id="32" name="Group 31"/>
+          <p:cNvGrpSpPr/>
+          <p:nvPr/>
+        </p:nvGrpSpPr>
+        <p:grpSpPr>
+          <a:xfrm rot="660000">
+            <a:off x="7275189" y="2127946"/>
+            <a:ext cx="628015" cy="2747010"/>
+            <a:chOff x="6973" y="3436"/>
+            <a:chExt cx="989" cy="4326"/>
+          </a:xfrm>
+        </p:grpSpPr>
+        <p:sp>
+          <p:nvSpPr>
+            <p:cNvPr id="33" name="Striped Right Arrow 32"/>
+            <p:cNvSpPr/>
+            <p:nvPr/>
+          </p:nvSpPr>
+          <p:spPr>
+            <a:xfrm rot="4020000">
+              <a:off x="5516" y="5316"/>
+              <a:ext cx="4326" cy="566"/>
+            </a:xfrm>
+            <a:prstGeom prst="stripedRightArrow">
+              <a:avLst/>
+            </a:prstGeom>
+          </p:spPr>
+          <p:style>
+            <a:lnRef idx="2">
+              <a:schemeClr val="accent1">
+                <a:shade val="50000"/>
+              </a:schemeClr>
+            </a:lnRef>
+            <a:fillRef idx="1">
+              <a:schemeClr val="accent1"/>
+            </a:fillRef>
+            <a:effectRef idx="0">
+              <a:schemeClr val="accent1"/>
+            </a:effectRef>
+            <a:fontRef idx="minor">
+              <a:schemeClr val="lt1"/>
+            </a:fontRef>
+          </p:style>
+          <p:txBody>
+            <a:bodyPr rtlCol="0" anchor="ctr"/>
+            <a:p>
+              <a:pPr algn="ctr"/>
+              <a:endParaRPr lang="en-US"/>
+            </a:p>
+          </p:txBody>
+        </p:sp>
+        <p:sp>
+          <p:nvSpPr>
+            <p:cNvPr id="34" name="Text Box 33"/>
+            <p:cNvSpPr txBox="1"/>
+            <p:nvPr/>
+          </p:nvSpPr>
+          <p:spPr>
+            <a:xfrm rot="4080000">
+              <a:off x="5668" y="5501"/>
+              <a:ext cx="3185" cy="576"/>
+            </a:xfrm>
+            <a:prstGeom prst="rect">
+              <a:avLst/>
+            </a:prstGeom>
+            <a:noFill/>
+          </p:spPr>
+          <p:txBody>
+            <a:bodyPr wrap="square" rtlCol="0">
+              <a:spAutoFit/>
+            </a:bodyPr>
+            <a:p>
+              <a:r>
+                <a:rPr lang="x-none" altLang="en-US" b="1"/>
+                <a:t>              NO</a:t>
+              </a:r>
+              <a:endParaRPr lang="x-none" altLang="en-US" b="1"/>
+            </a:p>
+          </p:txBody>
+        </p:sp>
+      </p:grpSp>
+      <p:grpSp>
+        <p:nvGrpSpPr>
+          <p:cNvPr id="35" name="Group 34"/>
+          <p:cNvGrpSpPr/>
+          <p:nvPr/>
+        </p:nvGrpSpPr>
+        <p:grpSpPr>
+          <a:xfrm rot="20520000">
+            <a:off x="8048609" y="2154457"/>
+            <a:ext cx="619760" cy="2747010"/>
+            <a:chOff x="4750" y="3340"/>
+            <a:chExt cx="976" cy="4326"/>
+          </a:xfrm>
+        </p:grpSpPr>
+        <p:sp>
+          <p:nvSpPr>
+            <p:cNvPr id="36" name="Striped Right Arrow 35"/>
+            <p:cNvSpPr/>
+            <p:nvPr/>
+          </p:nvSpPr>
+          <p:spPr>
+            <a:xfrm rot="17820000">
+              <a:off x="3280" y="5220"/>
+              <a:ext cx="4326" cy="566"/>
+            </a:xfrm>
+            <a:prstGeom prst="stripedRightArrow">
+              <a:avLst/>
+            </a:prstGeom>
+          </p:spPr>
+          <p:style>
+            <a:lnRef idx="2">
+              <a:schemeClr val="accent4">
+                <a:shade val="50000"/>
+              </a:schemeClr>
+            </a:lnRef>
+            <a:fillRef idx="1">
+              <a:schemeClr val="accent4"/>
+            </a:fillRef>
+            <a:effectRef idx="0">
+              <a:schemeClr val="accent4"/>
+            </a:effectRef>
+            <a:fontRef idx="minor">
+              <a:schemeClr val="lt1"/>
+            </a:fontRef>
+          </p:style>
+          <p:txBody>
+            <a:bodyPr rtlCol="0" anchor="ctr"/>
+            <a:p>
+              <a:pPr algn="ctr"/>
+              <a:endParaRPr lang="en-US"/>
+            </a:p>
+          </p:txBody>
+        </p:sp>
+        <p:sp>
+          <p:nvSpPr>
+            <p:cNvPr id="37" name="Text Box 36"/>
+            <p:cNvSpPr txBox="1"/>
+            <p:nvPr/>
+          </p:nvSpPr>
+          <p:spPr>
+            <a:xfrm rot="17880000">
+              <a:off x="3445" y="5109"/>
+              <a:ext cx="3185" cy="576"/>
+            </a:xfrm>
+            <a:prstGeom prst="rect">
+              <a:avLst/>
+            </a:prstGeom>
+            <a:noFill/>
+          </p:spPr>
+          <p:txBody>
+            <a:bodyPr wrap="square" rtlCol="0">
+              <a:spAutoFit/>
+            </a:bodyPr>
+            <a:p>
+              <a:r>
+                <a:rPr lang="x-none" altLang="en-US" b="1">
+                  <a:sym typeface="+mn-ea"/>
+                </a:rPr>
+                <a:t>are there new data?</a:t>
+              </a:r>
+              <a:endParaRPr lang="x-none" altLang="en-US" b="1"/>
+            </a:p>
+          </p:txBody>
+        </p:sp>
+      </p:grpSp>
+      <p:grpSp>
+        <p:nvGrpSpPr>
+          <p:cNvPr id="38" name="Group 37"/>
+          <p:cNvGrpSpPr/>
+          <p:nvPr/>
+        </p:nvGrpSpPr>
+        <p:grpSpPr>
+          <a:xfrm rot="660000">
+            <a:off x="8936984" y="2118421"/>
+            <a:ext cx="628015" cy="2747010"/>
+            <a:chOff x="6973" y="3436"/>
+            <a:chExt cx="989" cy="4326"/>
+          </a:xfrm>
+        </p:grpSpPr>
+        <p:sp>
+          <p:nvSpPr>
+            <p:cNvPr id="39" name="Striped Right Arrow 38"/>
+            <p:cNvSpPr/>
+            <p:nvPr/>
+          </p:nvSpPr>
+          <p:spPr>
+            <a:xfrm rot="4020000">
+              <a:off x="5516" y="5316"/>
+              <a:ext cx="4326" cy="566"/>
+            </a:xfrm>
+            <a:prstGeom prst="stripedRightArrow">
+              <a:avLst/>
+            </a:prstGeom>
+          </p:spPr>
+          <p:style>
+            <a:lnRef idx="2">
+              <a:schemeClr val="accent1">
+                <a:shade val="50000"/>
+              </a:schemeClr>
+            </a:lnRef>
+            <a:fillRef idx="1">
+              <a:schemeClr val="accent1"/>
+            </a:fillRef>
+            <a:effectRef idx="0">
+              <a:schemeClr val="accent1"/>
+            </a:effectRef>
+            <a:fontRef idx="minor">
+              <a:schemeClr val="lt1"/>
+            </a:fontRef>
+          </p:style>
+          <p:txBody>
+            <a:bodyPr rtlCol="0" anchor="ctr"/>
+            <a:p>
+              <a:pPr algn="ctr"/>
+              <a:endParaRPr lang="en-US"/>
+            </a:p>
+          </p:txBody>
+        </p:sp>
+        <p:sp>
+          <p:nvSpPr>
+            <p:cNvPr id="40" name="Text Box 39"/>
+            <p:cNvSpPr txBox="1"/>
+            <p:nvPr/>
+          </p:nvSpPr>
+          <p:spPr>
+            <a:xfrm rot="4080000">
+              <a:off x="5668" y="5501"/>
+              <a:ext cx="3185" cy="576"/>
+            </a:xfrm>
+            <a:prstGeom prst="rect">
+              <a:avLst/>
+            </a:prstGeom>
+            <a:noFill/>
+          </p:spPr>
+          <p:txBody>
+            <a:bodyPr wrap="square" rtlCol="0">
+              <a:spAutoFit/>
+            </a:bodyPr>
+            <a:p>
+              <a:r>
+                <a:rPr lang="x-none" altLang="en-US" b="1"/>
+                <a:t>             YES</a:t>
+              </a:r>
+              <a:endParaRPr lang="x-none" altLang="en-US" b="1"/>
+            </a:p>
+          </p:txBody>
+        </p:sp>
+      </p:grpSp>
+    </p:spTree>
+  </p:cSld>
+  <p:clrMapOvr>
+    <a:masterClrMapping/>
+  </p:clrMapOvr>
+</p:sld>
+</file>
+
+<file path=ppt/slides/slide3.xml><?xml version="1.0" encoding="utf-8"?>
+<p:sld xmlns:a="http://schemas.openxmlformats.org/drawingml/2006/main" xmlns:r="http://schemas.openxmlformats.org/officeDocument/2006/relationships" xmlns:p="http://schemas.openxmlformats.org/presentationml/2006/main">
+  <p:cSld>
+    <p:spTree>
+      <p:nvGrpSpPr>
+        <p:cNvPr id="1" name=""/>
+        <p:cNvGrpSpPr/>
+        <p:nvPr/>
+      </p:nvGrpSpPr>
+      <p:grpSpPr/>
+      <p:pic>
+        <p:nvPicPr>
+          <p:cNvPr id="15" name="Picture 14" descr="Meteor_pub"/>
+          <p:cNvPicPr>
+            <a:picLocks noChangeAspect="1"/>
+          </p:cNvPicPr>
+          <p:nvPr/>
+        </p:nvPicPr>
+        <p:blipFill>
+          <a:blip r:embed="rId1"/>
+          <a:stretch>
+            <a:fillRect/>
+          </a:stretch>
+        </p:blipFill>
+        <p:spPr>
+          <a:xfrm>
+            <a:off x="1036320" y="1332230"/>
+            <a:ext cx="1944370" cy="2176145"/>
+          </a:xfrm>
+          <a:prstGeom prst="rect">
+            <a:avLst/>
+          </a:prstGeom>
+        </p:spPr>
+      </p:pic>
+      <p:sp>
+        <p:nvSpPr>
+          <p:cNvPr id="4" name="Oval 3"/>
           <p:cNvSpPr/>
           <p:nvPr/>
         </p:nvSpPr>
         <p:spPr>
-          <a:xfrm rot="21120000">
-            <a:off x="2446655" y="4446270"/>
-            <a:ext cx="2929890" cy="321310"/>
-          </a:xfrm>
-          <a:prstGeom prst="stripedRightArrow">
+          <a:xfrm rot="2460000">
+            <a:off x="2539365" y="1849755"/>
+            <a:ext cx="5184140" cy="3686175"/>
+          </a:xfrm>
+          <a:prstGeom prst="ellipse">
             <a:avLst/>
           </a:prstGeom>
           <a:solidFill>
-            <a:schemeClr val="accent2">
-              <a:alpha val="64000"/>
+            <a:schemeClr val="accent1">
+              <a:lumMod val="60000"/>
+              <a:lumOff val="40000"/>
+              <a:alpha val="47000"/>
+            </a:schemeClr>
+          </a:solidFill>
+        </p:spPr>
+        <p:style>
+          <a:lnRef idx="2">
+            <a:schemeClr val="accent6"/>
+          </a:lnRef>
+          <a:fillRef idx="1">
+            <a:schemeClr val="lt1"/>
+          </a:fillRef>
+          <a:effectRef idx="0">
+            <a:schemeClr val="accent6"/>
+          </a:effectRef>
+          <a:fontRef idx="minor">
+            <a:schemeClr val="dk1"/>
+          </a:fontRef>
+        </p:style>
+        <p:txBody>
+          <a:bodyPr rtlCol="0" anchor="ctr"/>
+          <a:p>
+            <a:pPr algn="ctr"/>
+            <a:endParaRPr lang="en-US"/>
+          </a:p>
+        </p:txBody>
+      </p:sp>
+      <p:sp>
+        <p:nvSpPr>
+          <p:cNvPr id="6" name="Oval 5"/>
+          <p:cNvSpPr/>
+          <p:nvPr/>
+        </p:nvSpPr>
+        <p:spPr>
+          <a:xfrm rot="2580000">
+            <a:off x="2946400" y="2275840"/>
+            <a:ext cx="2777490" cy="1493520"/>
+          </a:xfrm>
+          <a:prstGeom prst="ellipse">
+            <a:avLst/>
+          </a:prstGeom>
+          <a:solidFill>
+            <a:schemeClr val="accent6">
+              <a:alpha val="56000"/>
             </a:schemeClr>
           </a:solidFill>
         </p:spPr>
@@ -3183,80 +4529,21 @@
       </p:sp>
       <p:sp>
         <p:nvSpPr>
-          <p:cNvPr id="12" name="Text Box 11"/>
-          <p:cNvSpPr txBox="1"/>
-          <p:nvPr/>
-        </p:nvSpPr>
-        <p:spPr>
-          <a:xfrm rot="21060000">
-            <a:off x="2630170" y="4692015"/>
-            <a:ext cx="2687320" cy="365760"/>
-          </a:xfrm>
-          <a:prstGeom prst="rect">
-            <a:avLst/>
-          </a:prstGeom>
-          <a:noFill/>
-        </p:spPr>
-        <p:txBody>
-          <a:bodyPr wrap="square" rtlCol="0">
-            <a:spAutoFit/>
-          </a:bodyPr>
-          <a:p>
-            <a:r>
-              <a:rPr lang="x-none" altLang="en-US" b="1"/>
-              <a:t>this is what I request to see</a:t>
-            </a:r>
-            <a:endParaRPr lang="x-none" altLang="en-US" b="1"/>
-          </a:p>
-        </p:txBody>
-      </p:sp>
-      <p:sp>
-        <p:nvSpPr>
-          <p:cNvPr id="13" name="Text Box 12"/>
-          <p:cNvSpPr txBox="1"/>
-          <p:nvPr/>
-        </p:nvSpPr>
-        <p:spPr>
-          <a:xfrm rot="19260000">
-            <a:off x="1736725" y="2962910"/>
-            <a:ext cx="2451735" cy="640080"/>
-          </a:xfrm>
-          <a:prstGeom prst="rect">
-            <a:avLst/>
-          </a:prstGeom>
-          <a:noFill/>
-        </p:spPr>
-        <p:txBody>
-          <a:bodyPr wrap="square" rtlCol="0">
-            <a:spAutoFit/>
-          </a:bodyPr>
-          <a:p>
-            <a:r>
-              <a:rPr lang="x-none" altLang="en-US" b="1"/>
-              <a:t>this is what the server would allow me to see</a:t>
-            </a:r>
-            <a:endParaRPr lang="x-none" altLang="en-US" b="1"/>
-          </a:p>
-        </p:txBody>
-      </p:sp>
-      <p:sp>
-        <p:nvSpPr>
-          <p:cNvPr id="14" name="Striped Right Arrow 13"/>
+          <p:cNvPr id="7" name="Oval 6"/>
           <p:cNvSpPr/>
           <p:nvPr/>
         </p:nvSpPr>
         <p:spPr>
-          <a:xfrm rot="8340000">
-            <a:off x="2075815" y="3486785"/>
-            <a:ext cx="2152650" cy="321310"/>
-          </a:xfrm>
-          <a:prstGeom prst="stripedRightArrow">
+          <a:xfrm>
+            <a:off x="4242435" y="2957830"/>
+            <a:ext cx="2804795" cy="2606675"/>
+          </a:xfrm>
+          <a:prstGeom prst="ellipse">
             <a:avLst/>
           </a:prstGeom>
           <a:solidFill>
-            <a:schemeClr val="accent6">
-              <a:lumMod val="75000"/>
-              <a:alpha val="64000"/>
+            <a:schemeClr val="accent2">
+              <a:alpha val="49000"/>
             </a:schemeClr>
           </a:solidFill>
         </p:spPr>
@@ -3286,22 +4573,86 @@
       </p:sp>
       <p:sp>
         <p:nvSpPr>
-          <p:cNvPr id="2" name="Left-Right Arrow 1"/>
+          <p:cNvPr id="8" name="Text Box 7"/>
+          <p:cNvSpPr txBox="1"/>
+          <p:nvPr/>
+        </p:nvSpPr>
+        <p:spPr>
+          <a:xfrm>
+            <a:off x="5120640" y="1993265"/>
+            <a:ext cx="1284605" cy="914400"/>
+          </a:xfrm>
+          <a:prstGeom prst="rect">
+            <a:avLst/>
+          </a:prstGeom>
+          <a:noFill/>
+        </p:spPr>
+        <p:txBody>
+          <a:bodyPr wrap="square" rtlCol="0">
+            <a:spAutoFit/>
+          </a:bodyPr>
+          <a:p>
+            <a:r>
+              <a:rPr lang="x-none" altLang="en-US" sz="5400" b="1">
+                <a:solidFill>
+                  <a:schemeClr val="accent1">
+                    <a:lumMod val="75000"/>
+                  </a:schemeClr>
+                </a:solidFill>
+              </a:rPr>
+              <a:t>DB</a:t>
+            </a:r>
+            <a:endParaRPr lang="x-none" altLang="en-US" sz="5400" b="1">
+              <a:solidFill>
+                <a:schemeClr val="accent1">
+                  <a:lumMod val="75000"/>
+                </a:schemeClr>
+              </a:solidFill>
+            </a:endParaRPr>
+          </a:p>
+        </p:txBody>
+      </p:sp>
+      <p:pic>
+        <p:nvPicPr>
+          <p:cNvPr id="10" name="Picture 9" descr="computer-1331579_960_720"/>
+          <p:cNvPicPr>
+            <a:picLocks noChangeAspect="1"/>
+          </p:cNvPicPr>
+          <p:nvPr/>
+        </p:nvPicPr>
+        <p:blipFill>
+          <a:blip r:embed="rId2"/>
+          <a:stretch>
+            <a:fillRect/>
+          </a:stretch>
+        </p:blipFill>
+        <p:spPr>
+          <a:xfrm>
+            <a:off x="1153160" y="4126230"/>
+            <a:ext cx="1559560" cy="1559560"/>
+          </a:xfrm>
+          <a:prstGeom prst="rect">
+            <a:avLst/>
+          </a:prstGeom>
+        </p:spPr>
+      </p:pic>
+      <p:sp>
+        <p:nvSpPr>
+          <p:cNvPr id="11" name="Striped Right Arrow 10"/>
           <p:cNvSpPr/>
           <p:nvPr/>
         </p:nvSpPr>
         <p:spPr>
-          <a:xfrm rot="19680000">
-            <a:off x="4401185" y="2629535"/>
-            <a:ext cx="3112135" cy="345440"/>
-          </a:xfrm>
-          <a:prstGeom prst="leftRightArrow">
+          <a:xfrm rot="21120000">
+            <a:off x="2748915" y="4428490"/>
+            <a:ext cx="2929890" cy="321310"/>
+          </a:xfrm>
+          <a:prstGeom prst="stripedRightArrow">
             <a:avLst/>
           </a:prstGeom>
           <a:solidFill>
-            <a:schemeClr val="accent4">
-              <a:lumMod val="60000"/>
-              <a:lumOff val="40000"/>
+            <a:schemeClr val="accent2">
+              <a:alpha val="64000"/>
             </a:schemeClr>
           </a:solidFill>
         </p:spPr>
@@ -3331,13 +4682,161 @@
       </p:sp>
       <p:sp>
         <p:nvSpPr>
+          <p:cNvPr id="12" name="Text Box 11"/>
+          <p:cNvSpPr txBox="1"/>
+          <p:nvPr/>
+        </p:nvSpPr>
+        <p:spPr>
+          <a:xfrm rot="21060000">
+            <a:off x="2896870" y="4692015"/>
+            <a:ext cx="2687320" cy="365760"/>
+          </a:xfrm>
+          <a:prstGeom prst="rect">
+            <a:avLst/>
+          </a:prstGeom>
+          <a:noFill/>
+        </p:spPr>
+        <p:txBody>
+          <a:bodyPr wrap="square" rtlCol="0">
+            <a:spAutoFit/>
+          </a:bodyPr>
+          <a:p>
+            <a:r>
+              <a:rPr lang="x-none" altLang="en-US" b="1"/>
+              <a:t>this is what I request to see</a:t>
+            </a:r>
+            <a:endParaRPr lang="x-none" altLang="en-US" b="1"/>
+          </a:p>
+        </p:txBody>
+      </p:sp>
+      <p:sp>
+        <p:nvSpPr>
+          <p:cNvPr id="13" name="Text Box 12"/>
+          <p:cNvSpPr txBox="1"/>
+          <p:nvPr/>
+        </p:nvSpPr>
+        <p:spPr>
+          <a:xfrm rot="19260000">
+            <a:off x="1967865" y="2980690"/>
+            <a:ext cx="2451735" cy="640080"/>
+          </a:xfrm>
+          <a:prstGeom prst="rect">
+            <a:avLst/>
+          </a:prstGeom>
+          <a:noFill/>
+        </p:spPr>
+        <p:txBody>
+          <a:bodyPr wrap="square" rtlCol="0">
+            <a:spAutoFit/>
+          </a:bodyPr>
+          <a:p>
+            <a:r>
+              <a:rPr lang="x-none" altLang="en-US" b="1"/>
+              <a:t>this is what the server would allow me to see</a:t>
+            </a:r>
+            <a:endParaRPr lang="x-none" altLang="en-US" b="1"/>
+          </a:p>
+        </p:txBody>
+      </p:sp>
+      <p:sp>
+        <p:nvSpPr>
+          <p:cNvPr id="14" name="Striped Right Arrow 13"/>
+          <p:cNvSpPr/>
+          <p:nvPr/>
+        </p:nvSpPr>
+        <p:spPr>
+          <a:xfrm rot="8340000">
+            <a:off x="2346325" y="3544570"/>
+            <a:ext cx="1976120" cy="321310"/>
+          </a:xfrm>
+          <a:prstGeom prst="stripedRightArrow">
+            <a:avLst/>
+          </a:prstGeom>
+          <a:solidFill>
+            <a:schemeClr val="accent6">
+              <a:lumMod val="75000"/>
+              <a:alpha val="64000"/>
+            </a:schemeClr>
+          </a:solidFill>
+        </p:spPr>
+        <p:style>
+          <a:lnRef idx="2">
+            <a:schemeClr val="accent1">
+              <a:shade val="50000"/>
+            </a:schemeClr>
+          </a:lnRef>
+          <a:fillRef idx="1">
+            <a:schemeClr val="accent1"/>
+          </a:fillRef>
+          <a:effectRef idx="0">
+            <a:schemeClr val="accent1"/>
+          </a:effectRef>
+          <a:fontRef idx="minor">
+            <a:schemeClr val="lt1"/>
+          </a:fontRef>
+        </p:style>
+        <p:txBody>
+          <a:bodyPr rtlCol="0" anchor="ctr"/>
+          <a:p>
+            <a:pPr algn="ctr"/>
+            <a:endParaRPr lang="en-US"/>
+          </a:p>
+        </p:txBody>
+      </p:sp>
+      <p:sp>
+        <p:nvSpPr>
+          <p:cNvPr id="2" name="Left-Right Arrow 1"/>
+          <p:cNvSpPr/>
+          <p:nvPr/>
+        </p:nvSpPr>
+        <p:spPr>
+          <a:xfrm rot="19680000">
+            <a:off x="4667885" y="2629535"/>
+            <a:ext cx="3112135" cy="345440"/>
+          </a:xfrm>
+          <a:prstGeom prst="leftRightArrow">
+            <a:avLst/>
+          </a:prstGeom>
+          <a:solidFill>
+            <a:schemeClr val="accent4">
+              <a:lumMod val="60000"/>
+              <a:lumOff val="40000"/>
+            </a:schemeClr>
+          </a:solidFill>
+        </p:spPr>
+        <p:style>
+          <a:lnRef idx="2">
+            <a:schemeClr val="accent1">
+              <a:shade val="50000"/>
+            </a:schemeClr>
+          </a:lnRef>
+          <a:fillRef idx="1">
+            <a:schemeClr val="accent1"/>
+          </a:fillRef>
+          <a:effectRef idx="0">
+            <a:schemeClr val="accent1"/>
+          </a:effectRef>
+          <a:fontRef idx="minor">
+            <a:schemeClr val="lt1"/>
+          </a:fontRef>
+        </p:style>
+        <p:txBody>
+          <a:bodyPr rtlCol="0" anchor="ctr"/>
+          <a:p>
+            <a:pPr algn="ctr"/>
+            <a:endParaRPr lang="en-US"/>
+          </a:p>
+        </p:txBody>
+      </p:sp>
+      <p:sp>
+        <p:nvSpPr>
           <p:cNvPr id="3" name="Text Box 2"/>
           <p:cNvSpPr txBox="1"/>
           <p:nvPr/>
         </p:nvSpPr>
         <p:spPr>
           <a:xfrm rot="60000">
-            <a:off x="6091555" y="1217295"/>
+            <a:off x="6358255" y="1217295"/>
             <a:ext cx="3110865" cy="640080"/>
           </a:xfrm>
           <a:prstGeom prst="rect">
@@ -3374,7 +4873,7 @@
         </p:blipFill>
         <p:spPr>
           <a:xfrm>
-            <a:off x="7192010" y="2273300"/>
+            <a:off x="7458710" y="2273300"/>
             <a:ext cx="1814830" cy="1361440"/>
           </a:xfrm>
           <a:prstGeom prst="rect">
@@ -3398,7 +4897,7 @@
         </p:blipFill>
         <p:spPr>
           <a:xfrm>
-            <a:off x="7192645" y="3869055"/>
+            <a:off x="7459345" y="3869055"/>
             <a:ext cx="1833245" cy="1833245"/>
           </a:xfrm>
           <a:prstGeom prst="rect">
@@ -3422,7 +4921,7 @@
         </p:blipFill>
         <p:spPr>
           <a:xfrm>
-            <a:off x="8307070" y="3324860"/>
+            <a:off x="8573770" y="3324860"/>
             <a:ext cx="785495" cy="785495"/>
           </a:xfrm>
           <a:prstGeom prst="rect">
@@ -3430,6 +4929,88 @@
           </a:prstGeom>
         </p:spPr>
       </p:pic>
+      <p:sp>
+        <p:nvSpPr>
+          <p:cNvPr id="5" name="Text Box 4"/>
+          <p:cNvSpPr txBox="1"/>
+          <p:nvPr/>
+        </p:nvSpPr>
+        <p:spPr>
+          <a:xfrm rot="2640000">
+            <a:off x="4011295" y="2441575"/>
+            <a:ext cx="958850" cy="640080"/>
+          </a:xfrm>
+          <a:prstGeom prst="rect">
+            <a:avLst/>
+          </a:prstGeom>
+          <a:noFill/>
+        </p:spPr>
+        <p:txBody>
+          <a:bodyPr wrap="square" rtlCol="0">
+            <a:spAutoFit/>
+          </a:bodyPr>
+          <a:p>
+            <a:r>
+              <a:rPr lang="x-none" altLang="en-US" sz="3600" b="1">
+                <a:solidFill>
+                  <a:schemeClr val="accent6">
+                    <a:lumMod val="75000"/>
+                  </a:schemeClr>
+                </a:solidFill>
+              </a:rPr>
+              <a:t>Pub</a:t>
+            </a:r>
+            <a:endParaRPr lang="x-none" altLang="en-US" sz="3600" b="1">
+              <a:solidFill>
+                <a:schemeClr val="accent6">
+                  <a:lumMod val="75000"/>
+                </a:schemeClr>
+              </a:solidFill>
+            </a:endParaRPr>
+          </a:p>
+        </p:txBody>
+      </p:sp>
+      <p:sp>
+        <p:nvSpPr>
+          <p:cNvPr id="18" name="Text Box 17"/>
+          <p:cNvSpPr txBox="1"/>
+          <p:nvPr/>
+        </p:nvSpPr>
+        <p:spPr>
+          <a:xfrm rot="60000">
+            <a:off x="5790565" y="3692525"/>
+            <a:ext cx="958850" cy="640080"/>
+          </a:xfrm>
+          <a:prstGeom prst="rect">
+            <a:avLst/>
+          </a:prstGeom>
+          <a:noFill/>
+        </p:spPr>
+        <p:txBody>
+          <a:bodyPr wrap="square" rtlCol="0">
+            <a:spAutoFit/>
+          </a:bodyPr>
+          <a:p>
+            <a:r>
+              <a:rPr lang="x-none" altLang="en-US" sz="3600" b="1">
+                <a:solidFill>
+                  <a:schemeClr val="accent2">
+                    <a:lumMod val="75000"/>
+                  </a:schemeClr>
+                </a:solidFill>
+              </a:rPr>
+              <a:t>Sub</a:t>
+            </a:r>
+            <a:endParaRPr lang="x-none" altLang="en-US" sz="3600" b="1">
+              <a:solidFill>
+                <a:schemeClr val="accent2">
+                  <a:lumMod val="75000"/>
+                </a:schemeClr>
+              </a:solidFill>
+            </a:endParaRPr>
+          </a:p>
+        </p:txBody>
+      </p:sp>
     </p:spTree>
   </p:cSld>
   <p:clrMapOvr>

</xml_diff>